<commit_message>
Update `extent`, `layer`, editors. Add Contributors section, remove authors. Add `checked` to examples of local and remote content. Update extent content model to allow `map-meta` description of zoom and spatial bounds.
Update resources, examples, checked attribute description

Address @AliyanH comments: projection now read-write.  Remote content
prioritized over local content. map-meta can exist in extent elements.
Fix typo in layer label attribute description.

Co-authored-by: Hanyu Yao <97408822+yhy0217@users.noreply.github.com>
Co-authored-by: Aliyan Haq <aliyan.haq@nrcan-rncan.gc.ca>
</commit_message>
<xml_diff>
--- a/resources/tcrs.pptx
+++ b/resources/tcrs.pptx
@@ -218,7 +218,7 @@
           <a:p>
             <a:fld id="{4DBBD189-96E9-46B4-AD8F-C82A888AE887}" type="datetimeFigureOut">
               <a:rPr lang="en-CA" smtClean="0"/>
-              <a:t>2023-06-29</a:t>
+              <a:t>2023-11-07</a:t>
             </a:fld>
             <a:endParaRPr lang="en-CA"/>
           </a:p>
@@ -617,7 +617,7 @@
           <a:p>
             <a:fld id="{0062E371-98E4-479B-95D6-4889C56667E5}" type="datetimeFigureOut">
               <a:rPr lang="en-CA" smtClean="0"/>
-              <a:t>2023-06-29</a:t>
+              <a:t>2023-11-07</a:t>
             </a:fld>
             <a:endParaRPr lang="en-CA"/>
           </a:p>
@@ -787,7 +787,7 @@
           <a:p>
             <a:fld id="{0062E371-98E4-479B-95D6-4889C56667E5}" type="datetimeFigureOut">
               <a:rPr lang="en-CA" smtClean="0"/>
-              <a:t>2023-06-29</a:t>
+              <a:t>2023-11-07</a:t>
             </a:fld>
             <a:endParaRPr lang="en-CA"/>
           </a:p>
@@ -967,7 +967,7 @@
           <a:p>
             <a:fld id="{0062E371-98E4-479B-95D6-4889C56667E5}" type="datetimeFigureOut">
               <a:rPr lang="en-CA" smtClean="0"/>
-              <a:t>2023-06-29</a:t>
+              <a:t>2023-11-07</a:t>
             </a:fld>
             <a:endParaRPr lang="en-CA"/>
           </a:p>
@@ -1137,7 +1137,7 @@
           <a:p>
             <a:fld id="{0062E371-98E4-479B-95D6-4889C56667E5}" type="datetimeFigureOut">
               <a:rPr lang="en-CA" smtClean="0"/>
-              <a:t>2023-06-29</a:t>
+              <a:t>2023-11-07</a:t>
             </a:fld>
             <a:endParaRPr lang="en-CA"/>
           </a:p>
@@ -1383,7 +1383,7 @@
           <a:p>
             <a:fld id="{0062E371-98E4-479B-95D6-4889C56667E5}" type="datetimeFigureOut">
               <a:rPr lang="en-CA" smtClean="0"/>
-              <a:t>2023-06-29</a:t>
+              <a:t>2023-11-07</a:t>
             </a:fld>
             <a:endParaRPr lang="en-CA"/>
           </a:p>
@@ -1615,7 +1615,7 @@
           <a:p>
             <a:fld id="{0062E371-98E4-479B-95D6-4889C56667E5}" type="datetimeFigureOut">
               <a:rPr lang="en-CA" smtClean="0"/>
-              <a:t>2023-06-29</a:t>
+              <a:t>2023-11-07</a:t>
             </a:fld>
             <a:endParaRPr lang="en-CA"/>
           </a:p>
@@ -1982,7 +1982,7 @@
           <a:p>
             <a:fld id="{0062E371-98E4-479B-95D6-4889C56667E5}" type="datetimeFigureOut">
               <a:rPr lang="en-CA" smtClean="0"/>
-              <a:t>2023-06-29</a:t>
+              <a:t>2023-11-07</a:t>
             </a:fld>
             <a:endParaRPr lang="en-CA"/>
           </a:p>
@@ -2100,7 +2100,7 @@
           <a:p>
             <a:fld id="{0062E371-98E4-479B-95D6-4889C56667E5}" type="datetimeFigureOut">
               <a:rPr lang="en-CA" smtClean="0"/>
-              <a:t>2023-06-29</a:t>
+              <a:t>2023-11-07</a:t>
             </a:fld>
             <a:endParaRPr lang="en-CA"/>
           </a:p>
@@ -2195,7 +2195,7 @@
           <a:p>
             <a:fld id="{0062E371-98E4-479B-95D6-4889C56667E5}" type="datetimeFigureOut">
               <a:rPr lang="en-CA" smtClean="0"/>
-              <a:t>2023-06-29</a:t>
+              <a:t>2023-11-07</a:t>
             </a:fld>
             <a:endParaRPr lang="en-CA"/>
           </a:p>
@@ -2472,7 +2472,7 @@
           <a:p>
             <a:fld id="{0062E371-98E4-479B-95D6-4889C56667E5}" type="datetimeFigureOut">
               <a:rPr lang="en-CA" smtClean="0"/>
-              <a:t>2023-06-29</a:t>
+              <a:t>2023-11-07</a:t>
             </a:fld>
             <a:endParaRPr lang="en-CA"/>
           </a:p>
@@ -2725,7 +2725,7 @@
           <a:p>
             <a:fld id="{0062E371-98E4-479B-95D6-4889C56667E5}" type="datetimeFigureOut">
               <a:rPr lang="en-CA" smtClean="0"/>
-              <a:t>2023-06-29</a:t>
+              <a:t>2023-11-07</a:t>
             </a:fld>
             <a:endParaRPr lang="en-CA"/>
           </a:p>
@@ -2938,7 +2938,7 @@
           <a:p>
             <a:fld id="{0062E371-98E4-479B-95D6-4889C56667E5}" type="datetimeFigureOut">
               <a:rPr lang="en-CA" smtClean="0"/>
-              <a:t>2023-06-29</a:t>
+              <a:t>2023-11-07</a:t>
             </a:fld>
             <a:endParaRPr lang="en-CA"/>
           </a:p>
@@ -8572,7 +8572,7 @@
                   <a:srgbClr val="FFFFFF"/>
                 </a:highlight>
               </a:rPr>
-              <a:t>"OSMTILE"</a:t>
+              <a:t>"OSMTILE“ checked=“checked”</a:t>
             </a:r>
             <a:r>
               <a:rPr lang="en-CA" sz="800" dirty="0">

</xml_diff>